<commit_message>
Terminal header image 변경
</commit_message>
<xml_diff>
--- a/_site/assets/docu/프레젠테이션1.pptx
+++ b/_site/assets/docu/프레젠테이션1.pptx
@@ -3362,8 +3362,8 @@
         </p:blipFill>
         <p:spPr>
           <a:xfrm>
-            <a:off x="-5751984" y="799863"/>
-            <a:ext cx="5530311" cy="5495961"/>
+            <a:off x="-4580965" y="-242347"/>
+            <a:ext cx="6964310" cy="6921053"/>
           </a:xfrm>
           <a:prstGeom prst="rect">
             <a:avLst/>
@@ -3397,7 +3397,7 @@
         </p:blipFill>
         <p:spPr>
           <a:xfrm>
-            <a:off x="141111" y="1766710"/>
+            <a:off x="129822" y="1969080"/>
             <a:ext cx="11932356" cy="3296357"/>
           </a:xfrm>
           <a:prstGeom prst="rect">
@@ -3425,8 +3425,8 @@
         </p:nvSpPr>
         <p:spPr>
           <a:xfrm>
-            <a:off x="344016" y="3429000"/>
-            <a:ext cx="6638161" cy="1169551"/>
+            <a:off x="448202" y="3366015"/>
+            <a:ext cx="6638161" cy="1446550"/>
           </a:xfrm>
           <a:prstGeom prst="rect">
             <a:avLst/>
@@ -3440,7 +3440,7 @@
           <a:lstStyle/>
           <a:p>
             <a:r>
-              <a:rPr lang="en-US" altLang="ko-KR" sz="7000" dirty="0">
+              <a:rPr lang="en-US" altLang="ko-KR" sz="8800" dirty="0">
                 <a:solidFill>
                   <a:schemeClr val="accent1">
                     <a:lumMod val="20000"/>
@@ -3451,7 +3451,7 @@
               </a:rPr>
               <a:t>Tech  Journal</a:t>
             </a:r>
-            <a:endParaRPr lang="ko-KR" altLang="en-US" sz="7000" dirty="0">
+            <a:endParaRPr lang="ko-KR" altLang="en-US" sz="8800" dirty="0">
               <a:solidFill>
                 <a:schemeClr val="accent1">
                   <a:lumMod val="20000"/>

</xml_diff>